<commit_message>
Added new RTS game
</commit_message>
<xml_diff>
--- a/vince_mckeown/DungeonExplorer/slides/pitch.pptx
+++ b/vince_mckeown/DungeonExplorer/slides/pitch.pptx
@@ -122,7 +122,7 @@
 <file path=ppt/revisionInfo.xml><?xml version="1.0" encoding="utf-8"?>
 <p1510:revInfo xmlns:a="http://schemas.openxmlformats.org/drawingml/2006/main" xmlns:r="http://schemas.openxmlformats.org/officeDocument/2006/relationships" xmlns:p1510="http://schemas.microsoft.com/office/powerpoint/2015/10/main">
   <p1510:revLst>
-    <p1510:client id="{A85D52D4-5BB4-419E-9F72-290F12A4CB0E}" v="373" dt="2023-10-21T17:07:45.710"/>
+    <p1510:client id="{A85D52D4-5BB4-419E-9F72-290F12A4CB0E}" v="459" dt="2024-04-07T11:28:00.612"/>
   </p1510:revLst>
 </p1510:revInfo>
 </file>
@@ -132,18 +132,18 @@
   <pc:docChgLst>
     <pc:chgData name="Pauline McKeown" userId="31f1b572cc8f689e" providerId="LiveId" clId="{A85D52D4-5BB4-419E-9F72-290F12A4CB0E}"/>
     <pc:docChg chg="undo custSel addSld delSld modSld">
-      <pc:chgData name="Pauline McKeown" userId="31f1b572cc8f689e" providerId="LiveId" clId="{A85D52D4-5BB4-419E-9F72-290F12A4CB0E}" dt="2023-10-21T17:07:45.704" v="1961"/>
+      <pc:chgData name="Pauline McKeown" userId="31f1b572cc8f689e" providerId="LiveId" clId="{A85D52D4-5BB4-419E-9F72-290F12A4CB0E}" dt="2024-04-07T11:48:34.204" v="2426" actId="20577"/>
       <pc:docMkLst>
         <pc:docMk/>
       </pc:docMkLst>
       <pc:sldChg chg="addSp delSp modSp mod modTransition">
-        <pc:chgData name="Pauline McKeown" userId="31f1b572cc8f689e" providerId="LiveId" clId="{A85D52D4-5BB4-419E-9F72-290F12A4CB0E}" dt="2023-10-21T17:07:45.704" v="1961"/>
+        <pc:chgData name="Pauline McKeown" userId="31f1b572cc8f689e" providerId="LiveId" clId="{A85D52D4-5BB4-419E-9F72-290F12A4CB0E}" dt="2024-04-07T10:34:57.690" v="2058" actId="20577"/>
         <pc:sldMkLst>
           <pc:docMk/>
           <pc:sldMk cId="4214349629" sldId="256"/>
         </pc:sldMkLst>
         <pc:spChg chg="mod ord">
-          <ac:chgData name="Pauline McKeown" userId="31f1b572cc8f689e" providerId="LiveId" clId="{A85D52D4-5BB4-419E-9F72-290F12A4CB0E}" dt="2023-10-14T13:33:35.251" v="330" actId="207"/>
+          <ac:chgData name="Pauline McKeown" userId="31f1b572cc8f689e" providerId="LiveId" clId="{A85D52D4-5BB4-419E-9F72-290F12A4CB0E}" dt="2024-04-07T10:31:01.684" v="1987" actId="20577"/>
           <ac:spMkLst>
             <pc:docMk/>
             <pc:sldMk cId="4214349629" sldId="256"/>
@@ -151,7 +151,7 @@
           </ac:spMkLst>
         </pc:spChg>
         <pc:spChg chg="mod">
-          <ac:chgData name="Pauline McKeown" userId="31f1b572cc8f689e" providerId="LiveId" clId="{A85D52D4-5BB4-419E-9F72-290F12A4CB0E}" dt="2023-10-20T15:55:12.003" v="1711" actId="20577"/>
+          <ac:chgData name="Pauline McKeown" userId="31f1b572cc8f689e" providerId="LiveId" clId="{A85D52D4-5BB4-419E-9F72-290F12A4CB0E}" dt="2024-04-07T10:34:57.690" v="2058" actId="20577"/>
           <ac:spMkLst>
             <pc:docMk/>
             <pc:sldMk cId="4214349629" sldId="256"/>
@@ -232,7 +232,7 @@
         </pc:picChg>
       </pc:sldChg>
       <pc:sldChg chg="addSp delSp modSp new mod modAnim">
-        <pc:chgData name="Pauline McKeown" userId="31f1b572cc8f689e" providerId="LiveId" clId="{A85D52D4-5BB4-419E-9F72-290F12A4CB0E}" dt="2023-10-20T15:55:40.555" v="1727" actId="20577"/>
+        <pc:chgData name="Pauline McKeown" userId="31f1b572cc8f689e" providerId="LiveId" clId="{A85D52D4-5BB4-419E-9F72-290F12A4CB0E}" dt="2024-04-07T10:37:26.094" v="2087" actId="20577"/>
         <pc:sldMkLst>
           <pc:docMk/>
           <pc:sldMk cId="2127320520" sldId="257"/>
@@ -243,6 +243,14 @@
             <pc:docMk/>
             <pc:sldMk cId="2127320520" sldId="257"/>
             <ac:spMk id="2" creationId="{44E74DF2-5EF2-3F34-75E3-2748D36A8B66}"/>
+          </ac:spMkLst>
+        </pc:spChg>
+        <pc:spChg chg="add mod">
+          <ac:chgData name="Pauline McKeown" userId="31f1b572cc8f689e" providerId="LiveId" clId="{A85D52D4-5BB4-419E-9F72-290F12A4CB0E}" dt="2024-04-07T10:37:26.094" v="2087" actId="20577"/>
+          <ac:spMkLst>
+            <pc:docMk/>
+            <pc:sldMk cId="2127320520" sldId="257"/>
+            <ac:spMk id="3" creationId="{0F1233F1-1E77-C182-5D72-ED217E21F9A7}"/>
           </ac:spMkLst>
         </pc:spChg>
         <pc:spChg chg="del">
@@ -390,14 +398,14 @@
           </ac:picMkLst>
         </pc:picChg>
       </pc:sldChg>
-      <pc:sldChg chg="addSp delSp modSp add mod">
-        <pc:chgData name="Pauline McKeown" userId="31f1b572cc8f689e" providerId="LiveId" clId="{A85D52D4-5BB4-419E-9F72-290F12A4CB0E}" dt="2023-10-15T18:52:22.338" v="603" actId="1076"/>
+      <pc:sldChg chg="addSp delSp modSp add mod setBg">
+        <pc:chgData name="Pauline McKeown" userId="31f1b572cc8f689e" providerId="LiveId" clId="{A85D52D4-5BB4-419E-9F72-290F12A4CB0E}" dt="2024-04-07T11:28:25.066" v="2396" actId="26606"/>
         <pc:sldMkLst>
           <pc:docMk/>
           <pc:sldMk cId="1465306405" sldId="258"/>
         </pc:sldMkLst>
         <pc:spChg chg="mod">
-          <ac:chgData name="Pauline McKeown" userId="31f1b572cc8f689e" providerId="LiveId" clId="{A85D52D4-5BB4-419E-9F72-290F12A4CB0E}" dt="2023-10-14T13:10:12.773" v="158" actId="20577"/>
+          <ac:chgData name="Pauline McKeown" userId="31f1b572cc8f689e" providerId="LiveId" clId="{A85D52D4-5BB4-419E-9F72-290F12A4CB0E}" dt="2024-04-07T11:28:25.066" v="2396" actId="26606"/>
           <ac:spMkLst>
             <pc:docMk/>
             <pc:sldMk cId="1465306405" sldId="258"/>
@@ -405,11 +413,27 @@
           </ac:spMkLst>
         </pc:spChg>
         <pc:spChg chg="mod">
-          <ac:chgData name="Pauline McKeown" userId="31f1b572cc8f689e" providerId="LiveId" clId="{A85D52D4-5BB4-419E-9F72-290F12A4CB0E}" dt="2023-10-15T18:42:28.774" v="590" actId="5793"/>
+          <ac:chgData name="Pauline McKeown" userId="31f1b572cc8f689e" providerId="LiveId" clId="{A85D52D4-5BB4-419E-9F72-290F12A4CB0E}" dt="2024-04-07T11:28:25.066" v="2396" actId="26606"/>
           <ac:spMkLst>
             <pc:docMk/>
             <pc:sldMk cId="1465306405" sldId="258"/>
             <ac:spMk id="3" creationId="{9C4EA411-11DE-E905-3421-2CAE8A6E3C02}"/>
+          </ac:spMkLst>
+        </pc:spChg>
+        <pc:spChg chg="add">
+          <ac:chgData name="Pauline McKeown" userId="31f1b572cc8f689e" providerId="LiveId" clId="{A85D52D4-5BB4-419E-9F72-290F12A4CB0E}" dt="2024-04-07T11:28:25.066" v="2396" actId="26606"/>
+          <ac:spMkLst>
+            <pc:docMk/>
+            <pc:sldMk cId="1465306405" sldId="258"/>
+            <ac:spMk id="13" creationId="{23C7736A-5A08-4021-9AB6-390DFF506AA8}"/>
+          </ac:spMkLst>
+        </pc:spChg>
+        <pc:spChg chg="add">
+          <ac:chgData name="Pauline McKeown" userId="31f1b572cc8f689e" providerId="LiveId" clId="{A85D52D4-5BB4-419E-9F72-290F12A4CB0E}" dt="2024-04-07T11:28:25.066" v="2396" actId="26606"/>
+          <ac:spMkLst>
+            <pc:docMk/>
+            <pc:sldMk cId="1465306405" sldId="258"/>
+            <ac:spMk id="15" creationId="{433DF4D3-8A35-461A-ABE0-F56B78A1371F}"/>
           </ac:spMkLst>
         </pc:spChg>
         <pc:picChg chg="add del mod">
@@ -420,12 +444,28 @@
             <ac:picMk id="4" creationId="{73A5BB44-8F78-1D7E-C837-12DD1A298F91}"/>
           </ac:picMkLst>
         </pc:picChg>
-        <pc:picChg chg="add mod">
-          <ac:chgData name="Pauline McKeown" userId="31f1b572cc8f689e" providerId="LiveId" clId="{A85D52D4-5BB4-419E-9F72-290F12A4CB0E}" dt="2023-10-15T18:52:22.338" v="603" actId="1076"/>
+        <pc:picChg chg="add mod ord">
+          <ac:chgData name="Pauline McKeown" userId="31f1b572cc8f689e" providerId="LiveId" clId="{A85D52D4-5BB4-419E-9F72-290F12A4CB0E}" dt="2024-04-07T11:28:25.066" v="2396" actId="26606"/>
+          <ac:picMkLst>
+            <pc:docMk/>
+            <pc:sldMk cId="1465306405" sldId="258"/>
+            <ac:picMk id="5" creationId="{FE4EECE1-4F3B-393B-ED56-42D8EBA90DCA}"/>
+          </ac:picMkLst>
+        </pc:picChg>
+        <pc:picChg chg="add del mod">
+          <ac:chgData name="Pauline McKeown" userId="31f1b572cc8f689e" providerId="LiveId" clId="{A85D52D4-5BB4-419E-9F72-290F12A4CB0E}" dt="2024-04-07T10:30:08.468" v="1962" actId="478"/>
           <ac:picMkLst>
             <pc:docMk/>
             <pc:sldMk cId="1465306405" sldId="258"/>
             <ac:picMk id="6" creationId="{D3AEEAF6-3AE7-327F-D32B-020B93A9F4D9}"/>
+          </ac:picMkLst>
+        </pc:picChg>
+        <pc:picChg chg="add mod ord">
+          <ac:chgData name="Pauline McKeown" userId="31f1b572cc8f689e" providerId="LiveId" clId="{A85D52D4-5BB4-419E-9F72-290F12A4CB0E}" dt="2024-04-07T11:28:25.066" v="2396" actId="26606"/>
+          <ac:picMkLst>
+            <pc:docMk/>
+            <pc:sldMk cId="1465306405" sldId="258"/>
+            <ac:picMk id="8" creationId="{E8EBB7F5-6602-9551-CDE5-3264B4C2AF3C}"/>
           </ac:picMkLst>
         </pc:picChg>
       </pc:sldChg>
@@ -445,13 +485,13 @@
         </pc:spChg>
       </pc:sldChg>
       <pc:sldChg chg="modSp add mod">
-        <pc:chgData name="Pauline McKeown" userId="31f1b572cc8f689e" providerId="LiveId" clId="{A85D52D4-5BB4-419E-9F72-290F12A4CB0E}" dt="2023-10-15T20:16:12.383" v="1652" actId="20577"/>
+        <pc:chgData name="Pauline McKeown" userId="31f1b572cc8f689e" providerId="LiveId" clId="{A85D52D4-5BB4-419E-9F72-290F12A4CB0E}" dt="2024-04-07T11:48:34.204" v="2426" actId="20577"/>
         <pc:sldMkLst>
           <pc:docMk/>
           <pc:sldMk cId="3244594980" sldId="260"/>
         </pc:sldMkLst>
         <pc:spChg chg="mod">
-          <ac:chgData name="Pauline McKeown" userId="31f1b572cc8f689e" providerId="LiveId" clId="{A85D52D4-5BB4-419E-9F72-290F12A4CB0E}" dt="2023-10-14T13:11:59.819" v="233" actId="20577"/>
+          <ac:chgData name="Pauline McKeown" userId="31f1b572cc8f689e" providerId="LiveId" clId="{A85D52D4-5BB4-419E-9F72-290F12A4CB0E}" dt="2024-04-07T11:48:25.017" v="2425" actId="20577"/>
           <ac:spMkLst>
             <pc:docMk/>
             <pc:sldMk cId="3244594980" sldId="260"/>
@@ -459,7 +499,7 @@
           </ac:spMkLst>
         </pc:spChg>
         <pc:spChg chg="mod">
-          <ac:chgData name="Pauline McKeown" userId="31f1b572cc8f689e" providerId="LiveId" clId="{A85D52D4-5BB4-419E-9F72-290F12A4CB0E}" dt="2023-10-15T20:16:12.383" v="1652" actId="20577"/>
+          <ac:chgData name="Pauline McKeown" userId="31f1b572cc8f689e" providerId="LiveId" clId="{A85D52D4-5BB4-419E-9F72-290F12A4CB0E}" dt="2024-04-07T11:48:34.204" v="2426" actId="20577"/>
           <ac:spMkLst>
             <pc:docMk/>
             <pc:sldMk cId="3244594980" sldId="260"/>
@@ -468,7 +508,7 @@
         </pc:spChg>
       </pc:sldChg>
       <pc:sldChg chg="addSp delSp modSp add mod">
-        <pc:chgData name="Pauline McKeown" userId="31f1b572cc8f689e" providerId="LiveId" clId="{A85D52D4-5BB4-419E-9F72-290F12A4CB0E}" dt="2023-10-20T15:56:28.402" v="1737" actId="20577"/>
+        <pc:chgData name="Pauline McKeown" userId="31f1b572cc8f689e" providerId="LiveId" clId="{A85D52D4-5BB4-419E-9F72-290F12A4CB0E}" dt="2024-04-07T10:48:16.071" v="2282" actId="20577"/>
         <pc:sldMkLst>
           <pc:docMk/>
           <pc:sldMk cId="1381033241" sldId="261"/>
@@ -490,7 +530,7 @@
           </ac:spMkLst>
         </pc:spChg>
         <pc:graphicFrameChg chg="add mod modGraphic">
-          <ac:chgData name="Pauline McKeown" userId="31f1b572cc8f689e" providerId="LiveId" clId="{A85D52D4-5BB4-419E-9F72-290F12A4CB0E}" dt="2023-10-20T15:56:28.402" v="1737" actId="20577"/>
+          <ac:chgData name="Pauline McKeown" userId="31f1b572cc8f689e" providerId="LiveId" clId="{A85D52D4-5BB4-419E-9F72-290F12A4CB0E}" dt="2024-04-07T10:48:16.071" v="2282" actId="20577"/>
           <ac:graphicFrameMkLst>
             <pc:docMk/>
             <pc:sldMk cId="1381033241" sldId="261"/>
@@ -522,7 +562,7 @@
         </pc:spChg>
       </pc:sldChg>
       <pc:sldChg chg="modSp add mod">
-        <pc:chgData name="Pauline McKeown" userId="31f1b572cc8f689e" providerId="LiveId" clId="{A85D52D4-5BB4-419E-9F72-290F12A4CB0E}" dt="2023-10-20T16:00:08.668" v="1960" actId="20577"/>
+        <pc:chgData name="Pauline McKeown" userId="31f1b572cc8f689e" providerId="LiveId" clId="{A85D52D4-5BB4-419E-9F72-290F12A4CB0E}" dt="2024-04-07T10:51:27.636" v="2380" actId="20577"/>
         <pc:sldMkLst>
           <pc:docMk/>
           <pc:sldMk cId="3916152852" sldId="263"/>
@@ -536,7 +576,7 @@
           </ac:spMkLst>
         </pc:spChg>
         <pc:spChg chg="mod">
-          <ac:chgData name="Pauline McKeown" userId="31f1b572cc8f689e" providerId="LiveId" clId="{A85D52D4-5BB4-419E-9F72-290F12A4CB0E}" dt="2023-10-20T16:00:08.668" v="1960" actId="20577"/>
+          <ac:chgData name="Pauline McKeown" userId="31f1b572cc8f689e" providerId="LiveId" clId="{A85D52D4-5BB4-419E-9F72-290F12A4CB0E}" dt="2024-04-07T10:51:27.636" v="2380" actId="20577"/>
           <ac:spMkLst>
             <pc:docMk/>
             <pc:sldMk cId="3916152852" sldId="263"/>
@@ -3434,14 +3474,14 @@
       </dgm:t>
     </dgm:pt>
     <dgm:pt modelId="{7D6372B8-D4BB-4A9A-ADA4-98F81D363F79}">
-      <dgm:prSet phldrT="[Text]"/>
+      <dgm:prSet phldrT="[Text]" custT="1"/>
       <dgm:spPr/>
       <dgm:t>
         <a:bodyPr/>
         <a:lstStyle/>
         <a:p>
           <a:r>
-            <a:rPr lang="en-US" sz="2100" dirty="0"/>
+            <a:rPr lang="en-US" sz="1800" dirty="0"/>
             <a:t>Combat</a:t>
           </a:r>
         </a:p>
@@ -3470,14 +3510,14 @@
       </dgm:t>
     </dgm:pt>
     <dgm:pt modelId="{6993D8EE-0DC4-4A16-BCEF-D0001D378C66}">
-      <dgm:prSet phldrT="[Text]"/>
+      <dgm:prSet phldrT="[Text]" custT="1"/>
       <dgm:spPr/>
       <dgm:t>
         <a:bodyPr/>
         <a:lstStyle/>
         <a:p>
           <a:r>
-            <a:rPr lang="en-US" sz="2100" dirty="0"/>
+            <a:rPr lang="en-US" sz="1800" dirty="0"/>
             <a:t>Inventory</a:t>
           </a:r>
         </a:p>
@@ -3542,14 +3582,14 @@
       </dgm:t>
     </dgm:pt>
     <dgm:pt modelId="{B8E008A8-8104-4B0D-9DDB-213F0041460F}">
-      <dgm:prSet phldrT="[Text]"/>
+      <dgm:prSet phldrT="[Text]" custT="1"/>
       <dgm:spPr/>
       <dgm:t>
         <a:bodyPr/>
         <a:lstStyle/>
         <a:p>
           <a:r>
-            <a:rPr lang="en-US" sz="2100" dirty="0"/>
+            <a:rPr lang="en-US" sz="1800" dirty="0"/>
             <a:t>Pathfinding</a:t>
           </a:r>
         </a:p>
@@ -3586,7 +3626,7 @@
         <a:p>
           <a:r>
             <a:rPr lang="en-US" sz="2100" dirty="0"/>
-            <a:t>Castle</a:t>
+            <a:t>Enemies</a:t>
           </a:r>
         </a:p>
       </dgm:t>
@@ -3757,42 +3797,6 @@
         </a:p>
       </dgm:t>
     </dgm:pt>
-    <dgm:pt modelId="{E07514EE-35D1-43D7-B4A9-77E6A51CFDC7}">
-      <dgm:prSet phldrT="[Text]" custT="1"/>
-      <dgm:spPr/>
-      <dgm:t>
-        <a:bodyPr/>
-        <a:lstStyle/>
-        <a:p>
-          <a:r>
-            <a:rPr lang="en-US" sz="2100" dirty="0"/>
-            <a:t>Catacombs</a:t>
-          </a:r>
-        </a:p>
-      </dgm:t>
-    </dgm:pt>
-    <dgm:pt modelId="{324DD7DF-97C6-46F9-8E0D-0834DA58704E}" type="parTrans" cxnId="{C74A8231-78FF-4A5C-9909-39265AE349A8}">
-      <dgm:prSet/>
-      <dgm:spPr/>
-      <dgm:t>
-        <a:bodyPr/>
-        <a:lstStyle/>
-        <a:p>
-          <a:endParaRPr lang="en-US"/>
-        </a:p>
-      </dgm:t>
-    </dgm:pt>
-    <dgm:pt modelId="{6AF7869B-60C2-4F3D-8EB1-F65443FEE595}" type="sibTrans" cxnId="{C74A8231-78FF-4A5C-9909-39265AE349A8}">
-      <dgm:prSet/>
-      <dgm:spPr/>
-      <dgm:t>
-        <a:bodyPr/>
-        <a:lstStyle/>
-        <a:p>
-          <a:endParaRPr lang="en-US"/>
-        </a:p>
-      </dgm:t>
-    </dgm:pt>
     <dgm:pt modelId="{7628AE3D-B74C-4C90-B0DC-28E4C1D9FF3C}">
       <dgm:prSet phldrT="[Text]" custT="1"/>
       <dgm:spPr/>
@@ -3802,7 +3806,7 @@
         <a:p>
           <a:r>
             <a:rPr lang="en-US" sz="2100" dirty="0"/>
-            <a:t>Monsters</a:t>
+            <a:t>Level Design</a:t>
           </a:r>
         </a:p>
       </dgm:t>
@@ -3837,8 +3841,8 @@
         <a:lstStyle/>
         <a:p>
           <a:r>
-            <a:rPr lang="en-US" sz="2100" dirty="0"/>
-            <a:t>Level</a:t>
+            <a:rPr lang="en-US" sz="1800" dirty="0"/>
+            <a:t>Placement</a:t>
           </a:r>
         </a:p>
       </dgm:t>
@@ -3873,10 +3877,9 @@
         <a:lstStyle/>
         <a:p>
           <a:r>
-            <a:rPr lang="en-US" sz="2100" dirty="0"/>
+            <a:rPr lang="en-US" sz="1800" dirty="0"/>
             <a:t>Puzzles</a:t>
           </a:r>
-          <a:endParaRPr lang="en-US" sz="2400" dirty="0"/>
         </a:p>
       </dgm:t>
     </dgm:pt>
@@ -4010,6 +4013,42 @@
         </a:p>
       </dgm:t>
     </dgm:pt>
+    <dgm:pt modelId="{66093D39-663F-4718-BAB0-E62C37A01369}">
+      <dgm:prSet phldrT="[Text]" custT="1"/>
+      <dgm:spPr/>
+      <dgm:t>
+        <a:bodyPr/>
+        <a:lstStyle/>
+        <a:p>
+          <a:r>
+            <a:rPr lang="en-US" sz="1800" dirty="0"/>
+            <a:t>Difficulty</a:t>
+          </a:r>
+        </a:p>
+      </dgm:t>
+    </dgm:pt>
+    <dgm:pt modelId="{5D87AB8F-87A8-4737-B0C7-8CF923A92139}" type="parTrans" cxnId="{B9E75233-A2ED-437C-9D80-81A1850FF748}">
+      <dgm:prSet/>
+      <dgm:spPr/>
+      <dgm:t>
+        <a:bodyPr/>
+        <a:lstStyle/>
+        <a:p>
+          <a:endParaRPr lang="en-US"/>
+        </a:p>
+      </dgm:t>
+    </dgm:pt>
+    <dgm:pt modelId="{6F3B364D-C7AD-48BF-B596-A9F1727F93C7}" type="sibTrans" cxnId="{B9E75233-A2ED-437C-9D80-81A1850FF748}">
+      <dgm:prSet/>
+      <dgm:spPr/>
+      <dgm:t>
+        <a:bodyPr/>
+        <a:lstStyle/>
+        <a:p>
+          <a:endParaRPr lang="en-US"/>
+        </a:p>
+      </dgm:t>
+    </dgm:pt>
     <dgm:pt modelId="{945715E5-A15F-4EB3-A663-C007B3F9427F}" type="pres">
       <dgm:prSet presAssocID="{AC395F03-F456-4DE2-8004-81FC65E4291B}" presName="Name0" presStyleCnt="0">
         <dgm:presLayoutVars>
@@ -4070,21 +4109,21 @@
     <dgm:cxn modelId="{CB4E380F-0823-40DA-BDE3-C38B6543AAB1}" type="presOf" srcId="{2E8ABB77-C9A0-4543-A1B6-DF9687BE5042}" destId="{B203C465-15F1-48BB-B76C-A1C08EA2DB95}" srcOrd="0" destOrd="3" presId="urn:microsoft.com/office/officeart/2005/8/layout/hChevron3"/>
     <dgm:cxn modelId="{A436790F-3FBB-47D5-B5DE-9AF4499C8511}" srcId="{D80B3018-4239-4024-BE34-20AD4B4BA90D}" destId="{80DA9952-68E5-4825-9FE6-9F28833ADA2B}" srcOrd="0" destOrd="0" parTransId="{1CE6E7F9-1192-4137-A486-5BB6784CF413}" sibTransId="{B1C06439-8EBB-4EDE-B00B-946780775733}"/>
     <dgm:cxn modelId="{29478415-314F-4B31-AEE9-B0EEB794D2E9}" type="presOf" srcId="{887DFC68-0DF8-4CAF-AC26-5D2F76A9B168}" destId="{F73A1A33-9B7A-451E-AC5A-7E10F06FB1D8}" srcOrd="0" destOrd="0" presId="urn:microsoft.com/office/officeart/2005/8/layout/hChevron3"/>
-    <dgm:cxn modelId="{85939015-867F-4E90-A78C-35AA2B10B994}" type="presOf" srcId="{E07514EE-35D1-43D7-B4A9-77E6A51CFDC7}" destId="{306CC7D4-86B5-4735-96EF-90B4573CD7CA}" srcOrd="0" destOrd="1" presId="urn:microsoft.com/office/officeart/2005/8/layout/hChevron3"/>
     <dgm:cxn modelId="{6E50271C-4868-4F62-9A9B-40A3E3D7982E}" srcId="{AC395F03-F456-4DE2-8004-81FC65E4291B}" destId="{52837896-590A-48FC-9EBF-4F07435C235F}" srcOrd="3" destOrd="0" parTransId="{4FAFD303-509D-4C13-B784-A77EC097E417}" sibTransId="{27C4ECCD-7376-4A59-BDD4-C50AB0694AA5}"/>
     <dgm:cxn modelId="{0F77571F-CB5A-4048-8860-ED3B29229D79}" type="presOf" srcId="{2C7AB860-542D-428F-A285-A1FCF5ABC8B5}" destId="{B203C465-15F1-48BB-B76C-A1C08EA2DB95}" srcOrd="0" destOrd="1" presId="urn:microsoft.com/office/officeart/2005/8/layout/hChevron3"/>
     <dgm:cxn modelId="{70384C28-D6B2-462D-8BE6-230700083960}" srcId="{AC395F03-F456-4DE2-8004-81FC65E4291B}" destId="{F80438B4-C1CA-4352-AD1A-237AAAC60D72}" srcOrd="2" destOrd="0" parTransId="{3FB10138-87A6-44F0-B446-6095FD2B0732}" sibTransId="{D1C89F3F-3E30-4E2E-9074-65E907508868}"/>
     <dgm:cxn modelId="{AB21D528-B2DB-4E5B-B323-2AA00102E54C}" srcId="{887DFC68-0DF8-4CAF-AC26-5D2F76A9B168}" destId="{9171D1FD-331C-43F2-BA8A-18A3C8E1740D}" srcOrd="0" destOrd="0" parTransId="{1A412F7A-DB27-4084-8E3B-DD7981090396}" sibTransId="{C2F0D146-379B-4708-AF2D-E4D674962808}"/>
-    <dgm:cxn modelId="{C74A8231-78FF-4A5C-9909-39265AE349A8}" srcId="{F80438B4-C1CA-4352-AD1A-237AAAC60D72}" destId="{E07514EE-35D1-43D7-B4A9-77E6A51CFDC7}" srcOrd="0" destOrd="0" parTransId="{324DD7DF-97C6-46F9-8E0D-0834DA58704E}" sibTransId="{6AF7869B-60C2-4F3D-8EB1-F65443FEE595}"/>
+    <dgm:cxn modelId="{B9E75233-A2ED-437C-9D80-81A1850FF748}" srcId="{7628AE3D-B74C-4C90-B0DC-28E4C1D9FF3C}" destId="{66093D39-663F-4718-BAB0-E62C37A01369}" srcOrd="2" destOrd="0" parTransId="{5D87AB8F-87A8-4737-B0C7-8CF923A92139}" sibTransId="{6F3B364D-C7AD-48BF-B596-A9F1727F93C7}"/>
     <dgm:cxn modelId="{D21C855D-9310-4BCD-A2D6-19013B0B0DFE}" srcId="{AC395F03-F456-4DE2-8004-81FC65E4291B}" destId="{29297AEF-8659-4B29-BF60-AA47593D8008}" srcOrd="1" destOrd="0" parTransId="{E4EF205E-E14E-40FE-9BBF-CAF8B8542140}" sibTransId="{74C9750A-F6AB-468A-94B7-A561EF507271}"/>
+    <dgm:cxn modelId="{C8D2645F-FAE8-4C8E-AC83-C8FEA6789F48}" type="presOf" srcId="{66093D39-663F-4718-BAB0-E62C37A01369}" destId="{306CC7D4-86B5-4735-96EF-90B4573CD7CA}" srcOrd="0" destOrd="4" presId="urn:microsoft.com/office/officeart/2005/8/layout/hChevron3"/>
     <dgm:cxn modelId="{3166DF5F-1365-46CB-A872-90359243F985}" srcId="{16C91B15-B722-488A-98C6-417082CB9FFD}" destId="{B8E008A8-8104-4B0D-9DDB-213F0041460F}" srcOrd="0" destOrd="0" parTransId="{E889392F-A4B5-4BD7-B61F-46951FA25D83}" sibTransId="{B3B9702B-6651-4540-AE86-24032B4901F4}"/>
-    <dgm:cxn modelId="{28C41160-08C1-4546-BC9C-F7E822440DC6}" type="presOf" srcId="{0D351C7E-0E01-4082-947D-370F7E1C1EB0}" destId="{306CC7D4-86B5-4735-96EF-90B4573CD7CA}" srcOrd="0" destOrd="4" presId="urn:microsoft.com/office/officeart/2005/8/layout/hChevron3"/>
-    <dgm:cxn modelId="{79875D61-B46E-4DAF-B250-31171C27F6B7}" srcId="{E07514EE-35D1-43D7-B4A9-77E6A51CFDC7}" destId="{0D351C7E-0E01-4082-947D-370F7E1C1EB0}" srcOrd="2" destOrd="0" parTransId="{62B31597-0820-4358-B77C-71DCBEC711B0}" sibTransId="{FA6AFC60-D148-4449-96F4-B00B743F3F35}"/>
+    <dgm:cxn modelId="{28C41160-08C1-4546-BC9C-F7E822440DC6}" type="presOf" srcId="{0D351C7E-0E01-4082-947D-370F7E1C1EB0}" destId="{306CC7D4-86B5-4735-96EF-90B4573CD7CA}" srcOrd="0" destOrd="3" presId="urn:microsoft.com/office/officeart/2005/8/layout/hChevron3"/>
+    <dgm:cxn modelId="{79875D61-B46E-4DAF-B250-31171C27F6B7}" srcId="{7628AE3D-B74C-4C90-B0DC-28E4C1D9FF3C}" destId="{0D351C7E-0E01-4082-947D-370F7E1C1EB0}" srcOrd="1" destOrd="0" parTransId="{62B31597-0820-4358-B77C-71DCBEC711B0}" sibTransId="{FA6AFC60-D148-4449-96F4-B00B743F3F35}"/>
     <dgm:cxn modelId="{5850AC41-B0E3-422C-BAF6-82B4E3C0D5B9}" type="presOf" srcId="{16C91B15-B722-488A-98C6-417082CB9FFD}" destId="{F73A1A33-9B7A-451E-AC5A-7E10F06FB1D8}" srcOrd="0" destOrd="2" presId="urn:microsoft.com/office/officeart/2005/8/layout/hChevron3"/>
     <dgm:cxn modelId="{7FE1FE42-9F7A-408D-8F5C-BD3715E8BD4D}" type="presOf" srcId="{9171D1FD-331C-43F2-BA8A-18A3C8E1740D}" destId="{F73A1A33-9B7A-451E-AC5A-7E10F06FB1D8}" srcOrd="0" destOrd="1" presId="urn:microsoft.com/office/officeart/2005/8/layout/hChevron3"/>
     <dgm:cxn modelId="{3DFAF44F-C509-456D-882D-7953E8C455EB}" srcId="{29297AEF-8659-4B29-BF60-AA47593D8008}" destId="{D80B3018-4239-4024-BE34-20AD4B4BA90D}" srcOrd="0" destOrd="0" parTransId="{7625A539-71AF-4CCD-AE36-70E6EABC9B35}" sibTransId="{859E3569-616D-4BF5-AE97-918988D0B3FC}"/>
-    <dgm:cxn modelId="{B47C5354-3321-4D41-9D11-3F9B6840E5A6}" type="presOf" srcId="{D29E88E0-7C36-40FD-B9DA-097B8966F5E8}" destId="{306CC7D4-86B5-4735-96EF-90B4573CD7CA}" srcOrd="0" destOrd="3" presId="urn:microsoft.com/office/officeart/2005/8/layout/hChevron3"/>
-    <dgm:cxn modelId="{5DCAC875-AA1F-457E-98EB-7F151882B5FF}" type="presOf" srcId="{7628AE3D-B74C-4C90-B0DC-28E4C1D9FF3C}" destId="{306CC7D4-86B5-4735-96EF-90B4573CD7CA}" srcOrd="0" destOrd="2" presId="urn:microsoft.com/office/officeart/2005/8/layout/hChevron3"/>
+    <dgm:cxn modelId="{B47C5354-3321-4D41-9D11-3F9B6840E5A6}" type="presOf" srcId="{D29E88E0-7C36-40FD-B9DA-097B8966F5E8}" destId="{306CC7D4-86B5-4735-96EF-90B4573CD7CA}" srcOrd="0" destOrd="2" presId="urn:microsoft.com/office/officeart/2005/8/layout/hChevron3"/>
+    <dgm:cxn modelId="{5DCAC875-AA1F-457E-98EB-7F151882B5FF}" type="presOf" srcId="{7628AE3D-B74C-4C90-B0DC-28E4C1D9FF3C}" destId="{306CC7D4-86B5-4735-96EF-90B4573CD7CA}" srcOrd="0" destOrd="1" presId="urn:microsoft.com/office/officeart/2005/8/layout/hChevron3"/>
     <dgm:cxn modelId="{BF9F0856-D2FD-4B56-A7CA-410C4B4EAF03}" type="presOf" srcId="{6993D8EE-0DC4-4A16-BCEF-D0001D378C66}" destId="{F73A1A33-9B7A-451E-AC5A-7E10F06FB1D8}" srcOrd="0" destOrd="5" presId="urn:microsoft.com/office/officeart/2005/8/layout/hChevron3"/>
     <dgm:cxn modelId="{804C6A58-0531-4141-825C-EED67AF03827}" srcId="{52837896-590A-48FC-9EBF-4F07435C235F}" destId="{2E8ABB77-C9A0-4543-A1B6-DF9687BE5042}" srcOrd="2" destOrd="0" parTransId="{9B815DB1-196C-4094-B897-43EAE8E887AE}" sibTransId="{FE07E6C8-9927-4436-9972-AC2588712B44}"/>
     <dgm:cxn modelId="{73DFD57B-17EE-4F3F-9606-4281400B15FE}" type="presOf" srcId="{FC2D5D16-0313-4CFE-8D22-44B214300941}" destId="{08780306-792E-4891-800E-003C8CABE436}" srcOrd="0" destOrd="4" presId="urn:microsoft.com/office/officeart/2005/8/layout/hChevron3"/>
@@ -4092,10 +4131,10 @@
     <dgm:cxn modelId="{7C802489-B1E4-43B8-85A5-194241ADF979}" type="presOf" srcId="{D80B3018-4239-4024-BE34-20AD4B4BA90D}" destId="{08780306-792E-4891-800E-003C8CABE436}" srcOrd="0" destOrd="1" presId="urn:microsoft.com/office/officeart/2005/8/layout/hChevron3"/>
     <dgm:cxn modelId="{9BEE5795-35EA-4861-8540-4C11E9786D55}" srcId="{D80B3018-4239-4024-BE34-20AD4B4BA90D}" destId="{8BA83E31-7642-44F9-8F45-0ACBECD06617}" srcOrd="1" destOrd="0" parTransId="{3CA3FACB-66CB-4935-A14A-1879AD4ABBA7}" sibTransId="{819BA6F1-BCF5-4346-AD83-BC3A5C193603}"/>
     <dgm:cxn modelId="{1847AC96-BB00-4504-AA46-B38D67C25710}" type="presOf" srcId="{8BA83E31-7642-44F9-8F45-0ACBECD06617}" destId="{08780306-792E-4891-800E-003C8CABE436}" srcOrd="0" destOrd="3" presId="urn:microsoft.com/office/officeart/2005/8/layout/hChevron3"/>
-    <dgm:cxn modelId="{C12933A4-F678-429F-B502-11AF501DD102}" srcId="{E07514EE-35D1-43D7-B4A9-77E6A51CFDC7}" destId="{7628AE3D-B74C-4C90-B0DC-28E4C1D9FF3C}" srcOrd="0" destOrd="0" parTransId="{6301FC5E-3E06-401B-B15E-9ABE78353AD5}" sibTransId="{EB8E0860-9A7E-4EFC-AF64-8E02A02D8DED}"/>
+    <dgm:cxn modelId="{C12933A4-F678-429F-B502-11AF501DD102}" srcId="{F80438B4-C1CA-4352-AD1A-237AAAC60D72}" destId="{7628AE3D-B74C-4C90-B0DC-28E4C1D9FF3C}" srcOrd="0" destOrd="0" parTransId="{6301FC5E-3E06-401B-B15E-9ABE78353AD5}" sibTransId="{EB8E0860-9A7E-4EFC-AF64-8E02A02D8DED}"/>
     <dgm:cxn modelId="{F94769A5-0A79-4B9C-A765-235F500401F5}" type="presOf" srcId="{AC395F03-F456-4DE2-8004-81FC65E4291B}" destId="{945715E5-A15F-4EB3-A663-C007B3F9427F}" srcOrd="0" destOrd="0" presId="urn:microsoft.com/office/officeart/2005/8/layout/hChevron3"/>
     <dgm:cxn modelId="{B360FEB2-E387-422D-9A1D-80142821220D}" srcId="{887DFC68-0DF8-4CAF-AC26-5D2F76A9B168}" destId="{16C91B15-B722-488A-98C6-417082CB9FFD}" srcOrd="1" destOrd="0" parTransId="{EC2C6214-D139-47AE-BC37-1E5ED0D4E149}" sibTransId="{0F6ECBE2-F247-4D3E-B30B-D42F9820C27F}"/>
-    <dgm:cxn modelId="{D2DD84BE-D710-4883-AAF3-3550FC696F3B}" srcId="{E07514EE-35D1-43D7-B4A9-77E6A51CFDC7}" destId="{D29E88E0-7C36-40FD-B9DA-097B8966F5E8}" srcOrd="1" destOrd="0" parTransId="{D95B2AA9-0970-4DBF-8746-66B9A9DAF226}" sibTransId="{6EAB8013-9506-4659-86AA-7F8B142A26D0}"/>
+    <dgm:cxn modelId="{D2DD84BE-D710-4883-AAF3-3550FC696F3B}" srcId="{7628AE3D-B74C-4C90-B0DC-28E4C1D9FF3C}" destId="{D29E88E0-7C36-40FD-B9DA-097B8966F5E8}" srcOrd="0" destOrd="0" parTransId="{D95B2AA9-0970-4DBF-8746-66B9A9DAF226}" sibTransId="{6EAB8013-9506-4659-86AA-7F8B142A26D0}"/>
     <dgm:cxn modelId="{38E993C3-DD90-479F-8092-7A29F779561A}" type="presOf" srcId="{F80438B4-C1CA-4352-AD1A-237AAAC60D72}" destId="{306CC7D4-86B5-4735-96EF-90B4573CD7CA}" srcOrd="0" destOrd="0" presId="urn:microsoft.com/office/officeart/2005/8/layout/hChevron3"/>
     <dgm:cxn modelId="{52CA9FC3-3D49-4C5E-86A8-DB22CC4BC972}" type="presOf" srcId="{29297AEF-8659-4B29-BF60-AA47593D8008}" destId="{08780306-792E-4891-800E-003C8CABE436}" srcOrd="0" destOrd="0" presId="urn:microsoft.com/office/officeart/2005/8/layout/hChevron3"/>
     <dgm:cxn modelId="{E83D2DD1-AAD9-41D2-B124-1168C9A805F1}" type="presOf" srcId="{52837896-590A-48FC-9EBF-4F07435C235F}" destId="{B203C465-15F1-48BB-B76C-A1C08EA2DB95}" srcOrd="0" destOrd="0" presId="urn:microsoft.com/office/officeart/2005/8/layout/hChevron3"/>
@@ -5450,7 +5489,7 @@
           </a:r>
         </a:p>
         <a:p>
-          <a:pPr marL="457200" lvl="2" indent="-228600" algn="l" defTabSz="933450">
+          <a:pPr marL="342900" lvl="2" indent="-171450" algn="l" defTabSz="800100">
             <a:lnSpc>
               <a:spcPct val="90000"/>
             </a:lnSpc>
@@ -5463,12 +5502,12 @@
             <a:buChar char="•"/>
           </a:pPr>
           <a:r>
-            <a:rPr lang="en-US" sz="2100" kern="1200" dirty="0"/>
+            <a:rPr lang="en-US" sz="1800" kern="1200" dirty="0"/>
             <a:t>Pathfinding</a:t>
           </a:r>
         </a:p>
         <a:p>
-          <a:pPr marL="457200" lvl="2" indent="-228600" algn="l" defTabSz="933450">
+          <a:pPr marL="342900" lvl="2" indent="-171450" algn="l" defTabSz="800100">
             <a:lnSpc>
               <a:spcPct val="90000"/>
             </a:lnSpc>
@@ -5481,12 +5520,12 @@
             <a:buChar char="•"/>
           </a:pPr>
           <a:r>
-            <a:rPr lang="en-US" sz="2100" kern="1200" dirty="0"/>
+            <a:rPr lang="en-US" sz="1800" kern="1200" dirty="0"/>
             <a:t>Combat</a:t>
           </a:r>
         </a:p>
         <a:p>
-          <a:pPr marL="457200" lvl="2" indent="-228600" algn="l" defTabSz="933450">
+          <a:pPr marL="342900" lvl="2" indent="-171450" algn="l" defTabSz="800100">
             <a:lnSpc>
               <a:spcPct val="90000"/>
             </a:lnSpc>
@@ -5499,7 +5538,7 @@
             <a:buChar char="•"/>
           </a:pPr>
           <a:r>
-            <a:rPr lang="en-US" sz="2100" kern="1200" dirty="0"/>
+            <a:rPr lang="en-US" sz="1800" kern="1200" dirty="0"/>
             <a:t>Inventory</a:t>
           </a:r>
         </a:p>
@@ -5597,7 +5636,7 @@
           </a:pPr>
           <a:r>
             <a:rPr lang="en-US" sz="2100" kern="1200" dirty="0"/>
-            <a:t>Castle</a:t>
+            <a:t>Enemies</a:t>
           </a:r>
         </a:p>
         <a:p>
@@ -5748,11 +5787,11 @@
           </a:pPr>
           <a:r>
             <a:rPr lang="en-US" sz="2100" kern="1200" dirty="0"/>
-            <a:t>Catacombs</a:t>
+            <a:t>Level Design</a:t>
           </a:r>
         </a:p>
         <a:p>
-          <a:pPr marL="457200" lvl="2" indent="-228600" algn="l" defTabSz="933450">
+          <a:pPr marL="342900" lvl="2" indent="-171450" algn="l" defTabSz="800100">
             <a:lnSpc>
               <a:spcPct val="90000"/>
             </a:lnSpc>
@@ -5765,12 +5804,12 @@
             <a:buChar char="•"/>
           </a:pPr>
           <a:r>
-            <a:rPr lang="en-US" sz="2100" kern="1200" dirty="0"/>
-            <a:t>Monsters</a:t>
+            <a:rPr lang="en-US" sz="1800" kern="1200" dirty="0"/>
+            <a:t>Placement</a:t>
           </a:r>
         </a:p>
         <a:p>
-          <a:pPr marL="457200" lvl="2" indent="-228600" algn="l" defTabSz="933450">
+          <a:pPr marL="342900" lvl="2" indent="-171450" algn="l" defTabSz="800100">
             <a:lnSpc>
               <a:spcPct val="90000"/>
             </a:lnSpc>
@@ -5783,12 +5822,12 @@
             <a:buChar char="•"/>
           </a:pPr>
           <a:r>
-            <a:rPr lang="en-US" sz="2100" kern="1200" dirty="0"/>
-            <a:t>Level</a:t>
+            <a:rPr lang="en-US" sz="1800" kern="1200" dirty="0"/>
+            <a:t>Puzzles</a:t>
           </a:r>
         </a:p>
         <a:p>
-          <a:pPr marL="457200" lvl="2" indent="-228600" algn="l" defTabSz="933450">
+          <a:pPr marL="342900" lvl="2" indent="-171450" algn="l" defTabSz="800100">
             <a:lnSpc>
               <a:spcPct val="90000"/>
             </a:lnSpc>
@@ -5801,10 +5840,9 @@
             <a:buChar char="•"/>
           </a:pPr>
           <a:r>
-            <a:rPr lang="en-US" sz="2100" kern="1200" dirty="0"/>
-            <a:t>Puzzles</a:t>
+            <a:rPr lang="en-US" sz="1800" kern="1200" dirty="0"/>
+            <a:t>Difficulty</a:t>
           </a:r>
-          <a:endParaRPr lang="en-US" sz="2400" kern="1200" dirty="0"/>
         </a:p>
       </dsp:txBody>
       <dsp:txXfrm>
@@ -8760,7 +8798,7 @@
           <a:p>
             <a:fld id="{4710969A-8FFC-4E3F-8A8A-4D4AF92BD055}" type="datetimeFigureOut">
               <a:rPr lang="en-US" smtClean="0"/>
-              <a:t>10/21/2023</a:t>
+              <a:t>4/7/2024</a:t>
             </a:fld>
             <a:endParaRPr lang="en-US"/>
           </a:p>
@@ -9098,7 +9136,7 @@
           <a:p>
             <a:fld id="{4710969A-8FFC-4E3F-8A8A-4D4AF92BD055}" type="datetimeFigureOut">
               <a:rPr lang="en-US" smtClean="0"/>
-              <a:t>10/21/2023</a:t>
+              <a:t>4/7/2024</a:t>
             </a:fld>
             <a:endParaRPr lang="en-US"/>
           </a:p>
@@ -9499,7 +9537,7 @@
           <a:p>
             <a:fld id="{4710969A-8FFC-4E3F-8A8A-4D4AF92BD055}" type="datetimeFigureOut">
               <a:rPr lang="en-US" smtClean="0"/>
-              <a:t>10/21/2023</a:t>
+              <a:t>4/7/2024</a:t>
             </a:fld>
             <a:endParaRPr lang="en-US"/>
           </a:p>
@@ -9835,7 +9873,7 @@
           <a:p>
             <a:fld id="{4710969A-8FFC-4E3F-8A8A-4D4AF92BD055}" type="datetimeFigureOut">
               <a:rPr lang="en-US" smtClean="0"/>
-              <a:t>10/21/2023</a:t>
+              <a:t>4/7/2024</a:t>
             </a:fld>
             <a:endParaRPr lang="en-US"/>
           </a:p>
@@ -10155,7 +10193,7 @@
           <a:p>
             <a:fld id="{4710969A-8FFC-4E3F-8A8A-4D4AF92BD055}" type="datetimeFigureOut">
               <a:rPr lang="en-US" smtClean="0"/>
-              <a:t>10/21/2023</a:t>
+              <a:t>4/7/2024</a:t>
             </a:fld>
             <a:endParaRPr lang="en-US"/>
           </a:p>
@@ -10551,7 +10589,7 @@
           <a:p>
             <a:fld id="{4710969A-8FFC-4E3F-8A8A-4D4AF92BD055}" type="datetimeFigureOut">
               <a:rPr lang="en-US" smtClean="0"/>
-              <a:t>10/21/2023</a:t>
+              <a:t>4/7/2024</a:t>
             </a:fld>
             <a:endParaRPr lang="en-US"/>
           </a:p>
@@ -10808,7 +10846,7 @@
           <a:p>
             <a:fld id="{4710969A-8FFC-4E3F-8A8A-4D4AF92BD055}" type="datetimeFigureOut">
               <a:rPr lang="en-US" smtClean="0"/>
-              <a:t>10/21/2023</a:t>
+              <a:t>4/7/2024</a:t>
             </a:fld>
             <a:endParaRPr lang="en-US"/>
           </a:p>
@@ -11070,7 +11108,7 @@
           <a:p>
             <a:fld id="{4710969A-8FFC-4E3F-8A8A-4D4AF92BD055}" type="datetimeFigureOut">
               <a:rPr lang="en-US" smtClean="0"/>
-              <a:t>10/21/2023</a:t>
+              <a:t>4/7/2024</a:t>
             </a:fld>
             <a:endParaRPr lang="en-US"/>
           </a:p>
@@ -11332,7 +11370,7 @@
           <a:p>
             <a:fld id="{4710969A-8FFC-4E3F-8A8A-4D4AF92BD055}" type="datetimeFigureOut">
               <a:rPr lang="en-US" smtClean="0"/>
-              <a:t>10/21/2023</a:t>
+              <a:t>4/7/2024</a:t>
             </a:fld>
             <a:endParaRPr lang="en-US"/>
           </a:p>
@@ -11661,7 +11699,7 @@
           <a:p>
             <a:fld id="{4710969A-8FFC-4E3F-8A8A-4D4AF92BD055}" type="datetimeFigureOut">
               <a:rPr lang="en-US" smtClean="0"/>
-              <a:t>10/21/2023</a:t>
+              <a:t>4/7/2024</a:t>
             </a:fld>
             <a:endParaRPr lang="en-US"/>
           </a:p>
@@ -11984,7 +12022,7 @@
           <a:p>
             <a:fld id="{4710969A-8FFC-4E3F-8A8A-4D4AF92BD055}" type="datetimeFigureOut">
               <a:rPr lang="en-US" smtClean="0"/>
-              <a:t>10/21/2023</a:t>
+              <a:t>4/7/2024</a:t>
             </a:fld>
             <a:endParaRPr lang="en-US"/>
           </a:p>
@@ -12441,7 +12479,7 @@
           <a:p>
             <a:fld id="{4710969A-8FFC-4E3F-8A8A-4D4AF92BD055}" type="datetimeFigureOut">
               <a:rPr lang="en-US" smtClean="0"/>
-              <a:t>10/21/2023</a:t>
+              <a:t>4/7/2024</a:t>
             </a:fld>
             <a:endParaRPr lang="en-US"/>
           </a:p>
@@ -12646,7 +12684,7 @@
           <a:p>
             <a:fld id="{4710969A-8FFC-4E3F-8A8A-4D4AF92BD055}" type="datetimeFigureOut">
               <a:rPr lang="en-US" smtClean="0"/>
-              <a:t>10/21/2023</a:t>
+              <a:t>4/7/2024</a:t>
             </a:fld>
             <a:endParaRPr lang="en-US"/>
           </a:p>
@@ -12823,7 +12861,7 @@
           <a:p>
             <a:fld id="{4710969A-8FFC-4E3F-8A8A-4D4AF92BD055}" type="datetimeFigureOut">
               <a:rPr lang="en-US" smtClean="0"/>
-              <a:t>10/21/2023</a:t>
+              <a:t>4/7/2024</a:t>
             </a:fld>
             <a:endParaRPr lang="en-US"/>
           </a:p>
@@ -13156,7 +13194,7 @@
           <a:p>
             <a:fld id="{4710969A-8FFC-4E3F-8A8A-4D4AF92BD055}" type="datetimeFigureOut">
               <a:rPr lang="en-US" smtClean="0"/>
-              <a:t>10/21/2023</a:t>
+              <a:t>4/7/2024</a:t>
             </a:fld>
             <a:endParaRPr lang="en-US"/>
           </a:p>
@@ -13501,7 +13539,7 @@
           <a:p>
             <a:fld id="{4710969A-8FFC-4E3F-8A8A-4D4AF92BD055}" type="datetimeFigureOut">
               <a:rPr lang="en-US" smtClean="0"/>
-              <a:t>10/21/2023</a:t>
+              <a:t>4/7/2024</a:t>
             </a:fld>
             <a:endParaRPr lang="en-US"/>
           </a:p>
@@ -15618,7 +15656,7 @@
           <a:p>
             <a:fld id="{4710969A-8FFC-4E3F-8A8A-4D4AF92BD055}" type="datetimeFigureOut">
               <a:rPr lang="en-US" smtClean="0"/>
-              <a:t>10/21/2023</a:t>
+              <a:t>4/7/2024</a:t>
             </a:fld>
             <a:endParaRPr lang="en-US"/>
           </a:p>
@@ -16166,7 +16204,7 @@
                   </a:schemeClr>
                 </a:solidFill>
               </a:rPr>
-              <a:t>Pitch Date:  October 22, 2023					Update October 22, 2023</a:t>
+              <a:t>Pitch Date:  April 7, 2024							Pitch!</a:t>
             </a:r>
           </a:p>
           <a:p>
@@ -16178,7 +16216,7 @@
                   </a:schemeClr>
                 </a:solidFill>
               </a:rPr>
-              <a:t>Release Date:  February 10, 2024					Commits</a:t>
+              <a:t>Release Date:  July 28, 2024						1 Commit</a:t>
             </a:r>
           </a:p>
           <a:p>
@@ -16600,7 +16638,7 @@
                 </a:solidFill>
                 <a:latin typeface="Lucida Handwriting" panose="03010101010101010101" pitchFamily="66" charset="0"/>
               </a:rPr>
-              <a:t>The Adventure of Salvatore</a:t>
+              <a:t>Underground Tactics</a:t>
             </a:r>
           </a:p>
         </p:txBody>
@@ -16615,13 +16653,13 @@
   <p:clrMapOvr>
     <a:masterClrMapping/>
   </p:clrMapOvr>
-  <mc:AlternateContent xmlns:mc="http://schemas.openxmlformats.org/markup-compatibility/2006">
-    <mc:Choice xmlns:p14="http://schemas.microsoft.com/office/powerpoint/2010/main" Requires="p14">
+  <mc:AlternateContent xmlns:mc="http://schemas.openxmlformats.org/markup-compatibility/2006" xmlns:p14="http://schemas.microsoft.com/office/powerpoint/2010/main">
+    <mc:Choice Requires="p14">
       <p:transition spd="slow" p14:dur="1500">
         <p:split orient="vert"/>
       </p:transition>
     </mc:Choice>
-    <mc:Fallback>
+    <mc:Fallback xmlns="">
       <p:transition spd="slow">
         <p:split orient="vert"/>
       </p:transition>
@@ -17140,6 +17178,45 @@
                 </a:solidFill>
               </a:rPr>
               <a:t>Springfield Property Manager</a:t>
+            </a:r>
+          </a:p>
+        </p:txBody>
+      </p:sp>
+      <p:sp>
+        <p:nvSpPr>
+          <p:cNvPr id="3" name="TextBox 2">
+            <a:extLst>
+              <a:ext uri="{FF2B5EF4-FFF2-40B4-BE49-F238E27FC236}">
+                <a16:creationId xmlns:a16="http://schemas.microsoft.com/office/drawing/2014/main" id="{0F1233F1-1E77-C182-5D72-ED217E21F9A7}"/>
+              </a:ext>
+            </a:extLst>
+          </p:cNvPr>
+          <p:cNvSpPr txBox="1"/>
+          <p:nvPr/>
+        </p:nvSpPr>
+        <p:spPr>
+          <a:xfrm>
+            <a:off x="611384" y="5654289"/>
+            <a:ext cx="3810408" cy="954107"/>
+          </a:xfrm>
+          <a:prstGeom prst="rect">
+            <a:avLst/>
+          </a:prstGeom>
+          <a:noFill/>
+        </p:spPr>
+        <p:txBody>
+          <a:bodyPr wrap="square" rtlCol="0">
+            <a:spAutoFit/>
+          </a:bodyPr>
+          <a:lstStyle/>
+          <a:p>
+            <a:r>
+              <a:rPr lang="en-US" sz="2800" b="1" dirty="0">
+                <a:solidFill>
+                  <a:schemeClr val="bg1"/>
+                </a:solidFill>
+              </a:rPr>
+              <a:t>The Adventures of Salvatore</a:t>
             </a:r>
           </a:p>
         </p:txBody>
@@ -17695,6 +17772,88 @@
                             </p:childTnLst>
                           </p:cTn>
                         </p:par>
+                        <p:par>
+                          <p:cTn id="36" fill="hold">
+                            <p:stCondLst>
+                              <p:cond delay="8500"/>
+                            </p:stCondLst>
+                            <p:childTnLst>
+                              <p:par>
+                                <p:cTn id="37" presetID="2" presetClass="entr" presetSubtype="4" fill="hold" grpId="0" nodeType="afterEffect">
+                                  <p:stCondLst>
+                                    <p:cond delay="0"/>
+                                  </p:stCondLst>
+                                  <p:childTnLst>
+                                    <p:set>
+                                      <p:cBhvr>
+                                        <p:cTn id="38" dur="1" fill="hold">
+                                          <p:stCondLst>
+                                            <p:cond delay="0"/>
+                                          </p:stCondLst>
+                                        </p:cTn>
+                                        <p:tgtEl>
+                                          <p:spTgt spid="3"/>
+                                        </p:tgtEl>
+                                        <p:attrNameLst>
+                                          <p:attrName>style.visibility</p:attrName>
+                                        </p:attrNameLst>
+                                      </p:cBhvr>
+                                      <p:to>
+                                        <p:strVal val="visible"/>
+                                      </p:to>
+                                    </p:set>
+                                    <p:anim calcmode="lin" valueType="num">
+                                      <p:cBhvr additive="base">
+                                        <p:cTn id="39" dur="500" fill="hold"/>
+                                        <p:tgtEl>
+                                          <p:spTgt spid="3"/>
+                                        </p:tgtEl>
+                                        <p:attrNameLst>
+                                          <p:attrName>ppt_x</p:attrName>
+                                        </p:attrNameLst>
+                                      </p:cBhvr>
+                                      <p:tavLst>
+                                        <p:tav tm="0">
+                                          <p:val>
+                                            <p:strVal val="#ppt_x"/>
+                                          </p:val>
+                                        </p:tav>
+                                        <p:tav tm="100000">
+                                          <p:val>
+                                            <p:strVal val="#ppt_x"/>
+                                          </p:val>
+                                        </p:tav>
+                                      </p:tavLst>
+                                    </p:anim>
+                                    <p:anim calcmode="lin" valueType="num">
+                                      <p:cBhvr additive="base">
+                                        <p:cTn id="40" dur="500" fill="hold"/>
+                                        <p:tgtEl>
+                                          <p:spTgt spid="3"/>
+                                        </p:tgtEl>
+                                        <p:attrNameLst>
+                                          <p:attrName>ppt_y</p:attrName>
+                                        </p:attrNameLst>
+                                      </p:cBhvr>
+                                      <p:tavLst>
+                                        <p:tav tm="0">
+                                          <p:val>
+                                            <p:strVal val="1+#ppt_h/2"/>
+                                          </p:val>
+                                        </p:tav>
+                                        <p:tav tm="100000">
+                                          <p:val>
+                                            <p:strVal val="#ppt_y"/>
+                                          </p:val>
+                                        </p:tav>
+                                      </p:tavLst>
+                                    </p:anim>
+                                  </p:childTnLst>
+                                </p:cTn>
+                              </p:par>
+                            </p:childTnLst>
+                          </p:cTn>
+                        </p:par>
                       </p:childTnLst>
                     </p:cTn>
                   </p:par>
@@ -17726,6 +17885,7 @@
       <p:bldP spid="7" grpId="0"/>
       <p:bldP spid="8" grpId="0"/>
       <p:bldP spid="9" grpId="0"/>
+      <p:bldP spid="3" grpId="0"/>
     </p:bldLst>
   </p:timing>
 </p:sld>
@@ -17734,6 +17894,32 @@
 <file path=ppt/slides/slide3.xml><?xml version="1.0" encoding="utf-8"?>
 <p:sld xmlns:a="http://schemas.openxmlformats.org/drawingml/2006/main" xmlns:r="http://schemas.openxmlformats.org/officeDocument/2006/relationships" xmlns:p="http://schemas.openxmlformats.org/presentationml/2006/main">
   <p:cSld>
+    <p:bg>
+      <p:bgPr>
+        <a:gradFill rotWithShape="1">
+          <a:gsLst>
+            <a:gs pos="0">
+              <a:schemeClr val="bg2">
+                <a:tint val="90000"/>
+                <a:satMod val="92000"/>
+                <a:lumMod val="120000"/>
+              </a:schemeClr>
+            </a:gs>
+            <a:gs pos="100000">
+              <a:schemeClr val="bg2">
+                <a:shade val="98000"/>
+                <a:satMod val="120000"/>
+                <a:lumMod val="98000"/>
+              </a:schemeClr>
+            </a:gs>
+          </a:gsLst>
+          <a:path path="circle">
+            <a:fillToRect l="50000" t="50000" r="100000" b="100000"/>
+          </a:path>
+        </a:gradFill>
+        <a:effectLst/>
+      </p:bgPr>
+    </p:bg>
     <p:spTree>
       <p:nvGrpSpPr>
         <p:cNvPr id="1" name=""/>
@@ -17748,6 +17934,335 @@
           <a:chExt cx="0" cy="0"/>
         </a:xfrm>
       </p:grpSpPr>
+      <p:pic>
+        <p:nvPicPr>
+          <p:cNvPr id="8" name="Picture 7" descr="A video game screen with characters and a building&#10;&#10;Description automatically generated">
+            <a:extLst>
+              <a:ext uri="{FF2B5EF4-FFF2-40B4-BE49-F238E27FC236}">
+                <a16:creationId xmlns:a16="http://schemas.microsoft.com/office/drawing/2014/main" id="{E8EBB7F5-6602-9551-CDE5-3264B4C2AF3C}"/>
+              </a:ext>
+            </a:extLst>
+          </p:cNvPr>
+          <p:cNvPicPr>
+            <a:picLocks noChangeAspect="1"/>
+          </p:cNvPicPr>
+          <p:nvPr/>
+        </p:nvPicPr>
+        <p:blipFill rotWithShape="1">
+          <a:blip r:embed="rId2">
+            <a:extLst>
+              <a:ext uri="{28A0092B-C50C-407E-A947-70E740481C1C}">
+                <a14:useLocalDpi xmlns:a14="http://schemas.microsoft.com/office/drawing/2010/main" val="0"/>
+              </a:ext>
+            </a:extLst>
+          </a:blip>
+          <a:srcRect t="20898" r="-1" b="-1"/>
+          <a:stretch/>
+        </p:blipFill>
+        <p:spPr>
+          <a:xfrm>
+            <a:off x="4485555" y="10"/>
+            <a:ext cx="7706444" cy="3428990"/>
+          </a:xfrm>
+          <a:prstGeom prst="rect">
+            <a:avLst/>
+          </a:prstGeom>
+        </p:spPr>
+      </p:pic>
+      <p:pic>
+        <p:nvPicPr>
+          <p:cNvPr id="5" name="Picture 4" descr="A game board with a game and dice">
+            <a:extLst>
+              <a:ext uri="{FF2B5EF4-FFF2-40B4-BE49-F238E27FC236}">
+                <a16:creationId xmlns:a16="http://schemas.microsoft.com/office/drawing/2014/main" id="{FE4EECE1-4F3B-393B-ED56-42D8EBA90DCA}"/>
+              </a:ext>
+            </a:extLst>
+          </p:cNvPr>
+          <p:cNvPicPr>
+            <a:picLocks noChangeAspect="1"/>
+          </p:cNvPicPr>
+          <p:nvPr/>
+        </p:nvPicPr>
+        <p:blipFill rotWithShape="1">
+          <a:blip r:embed="rId3">
+            <a:extLst>
+              <a:ext uri="{28A0092B-C50C-407E-A947-70E740481C1C}">
+                <a14:useLocalDpi xmlns:a14="http://schemas.microsoft.com/office/drawing/2010/main" val="0"/>
+              </a:ext>
+            </a:extLst>
+          </a:blip>
+          <a:srcRect t="17201" r="-1" b="13546"/>
+          <a:stretch/>
+        </p:blipFill>
+        <p:spPr>
+          <a:xfrm>
+            <a:off x="4485557" y="3429000"/>
+            <a:ext cx="7706443" cy="3429000"/>
+          </a:xfrm>
+          <a:prstGeom prst="rect">
+            <a:avLst/>
+          </a:prstGeom>
+        </p:spPr>
+      </p:pic>
+      <p:sp useBgFill="1">
+        <p:nvSpPr>
+          <p:cNvPr id="13" name="Freeform: Shape 12">
+            <a:extLst>
+              <a:ext uri="{FF2B5EF4-FFF2-40B4-BE49-F238E27FC236}">
+                <a16:creationId xmlns:a16="http://schemas.microsoft.com/office/drawing/2014/main" id="{23C7736A-5A08-4021-9AB6-390DFF506AA8}"/>
+              </a:ext>
+              <a:ext uri="{C183D7F6-B498-43B3-948B-1728B52AA6E4}">
+                <adec:decorative xmlns:adec="http://schemas.microsoft.com/office/drawing/2017/decorative" val="1"/>
+              </a:ext>
+            </a:extLst>
+          </p:cNvPr>
+          <p:cNvSpPr>
+            <a:spLocks noGrp="1" noRot="1" noChangeAspect="1" noMove="1" noResize="1" noEditPoints="1" noAdjustHandles="1" noChangeArrowheads="1" noChangeShapeType="1" noTextEdit="1"/>
+          </p:cNvSpPr>
+          <p:nvPr>
+            <p:extLst>
+              <p:ext uri="{386F3935-93C4-4BCD-93E2-E3B085C9AB24}">
+                <p16:designElem xmlns:p16="http://schemas.microsoft.com/office/powerpoint/2015/main" val="1"/>
+              </p:ext>
+            </p:extLst>
+          </p:nvPr>
+        </p:nvSpPr>
+        <p:spPr bwMode="grayWhite">
+          <a:xfrm>
+            <a:off x="0" y="0"/>
+            <a:ext cx="8170246" cy="6858000"/>
+          </a:xfrm>
+          <a:custGeom>
+            <a:avLst/>
+            <a:gdLst>
+              <a:gd name="connsiteX0" fmla="*/ 4738960 w 8170246"/>
+              <a:gd name="connsiteY0" fmla="*/ 0 h 6858000"/>
+              <a:gd name="connsiteX1" fmla="*/ 4862151 w 8170246"/>
+              <a:gd name="connsiteY1" fmla="*/ 0 h 6858000"/>
+              <a:gd name="connsiteX2" fmla="*/ 8088169 w 8170246"/>
+              <a:gd name="connsiteY2" fmla="*/ 3226735 h 6858000"/>
+              <a:gd name="connsiteX3" fmla="*/ 8088169 w 8170246"/>
+              <a:gd name="connsiteY3" fmla="*/ 3626507 h 6858000"/>
+              <a:gd name="connsiteX4" fmla="*/ 4857393 w 8170246"/>
+              <a:gd name="connsiteY4" fmla="*/ 6858000 h 6858000"/>
+              <a:gd name="connsiteX5" fmla="*/ 4783581 w 8170246"/>
+              <a:gd name="connsiteY5" fmla="*/ 6858000 h 6858000"/>
+              <a:gd name="connsiteX6" fmla="*/ 4734202 w 8170246"/>
+              <a:gd name="connsiteY6" fmla="*/ 6858000 h 6858000"/>
+              <a:gd name="connsiteX7" fmla="*/ 7964978 w 8170246"/>
+              <a:gd name="connsiteY7" fmla="*/ 3626507 h 6858000"/>
+              <a:gd name="connsiteX8" fmla="*/ 7964978 w 8170246"/>
+              <a:gd name="connsiteY8" fmla="*/ 3226735 h 6858000"/>
+              <a:gd name="connsiteX9" fmla="*/ 4738960 w 8170246"/>
+              <a:gd name="connsiteY9" fmla="*/ 0 h 6858000"/>
+              <a:gd name="connsiteX10" fmla="*/ 0 w 8170246"/>
+              <a:gd name="connsiteY10" fmla="*/ 0 h 6858000"/>
+              <a:gd name="connsiteX11" fmla="*/ 98791 w 8170246"/>
+              <a:gd name="connsiteY11" fmla="*/ 0 h 6858000"/>
+              <a:gd name="connsiteX12" fmla="*/ 4456718 w 8170246"/>
+              <a:gd name="connsiteY12" fmla="*/ 0 h 6858000"/>
+              <a:gd name="connsiteX13" fmla="*/ 4603489 w 8170246"/>
+              <a:gd name="connsiteY13" fmla="*/ 0 h 6858000"/>
+              <a:gd name="connsiteX14" fmla="*/ 7829507 w 8170246"/>
+              <a:gd name="connsiteY14" fmla="*/ 3226735 h 6858000"/>
+              <a:gd name="connsiteX15" fmla="*/ 7829507 w 8170246"/>
+              <a:gd name="connsiteY15" fmla="*/ 3626507 h 6858000"/>
+              <a:gd name="connsiteX16" fmla="*/ 4598731 w 8170246"/>
+              <a:gd name="connsiteY16" fmla="*/ 6858000 h 6858000"/>
+              <a:gd name="connsiteX17" fmla="*/ 4540663 w 8170246"/>
+              <a:gd name="connsiteY17" fmla="*/ 6858000 h 6858000"/>
+              <a:gd name="connsiteX18" fmla="*/ 133398 w 8170246"/>
+              <a:gd name="connsiteY18" fmla="*/ 6858000 h 6858000"/>
+              <a:gd name="connsiteX19" fmla="*/ 0 w 8170246"/>
+              <a:gd name="connsiteY19" fmla="*/ 6858000 h 6858000"/>
+            </a:gdLst>
+            <a:ahLst/>
+            <a:cxnLst>
+              <a:cxn ang="0">
+                <a:pos x="connsiteX0" y="connsiteY0"/>
+              </a:cxn>
+              <a:cxn ang="0">
+                <a:pos x="connsiteX1" y="connsiteY1"/>
+              </a:cxn>
+              <a:cxn ang="0">
+                <a:pos x="connsiteX2" y="connsiteY2"/>
+              </a:cxn>
+              <a:cxn ang="0">
+                <a:pos x="connsiteX3" y="connsiteY3"/>
+              </a:cxn>
+              <a:cxn ang="0">
+                <a:pos x="connsiteX4" y="connsiteY4"/>
+              </a:cxn>
+              <a:cxn ang="0">
+                <a:pos x="connsiteX5" y="connsiteY5"/>
+              </a:cxn>
+              <a:cxn ang="0">
+                <a:pos x="connsiteX6" y="connsiteY6"/>
+              </a:cxn>
+              <a:cxn ang="0">
+                <a:pos x="connsiteX7" y="connsiteY7"/>
+              </a:cxn>
+              <a:cxn ang="0">
+                <a:pos x="connsiteX8" y="connsiteY8"/>
+              </a:cxn>
+              <a:cxn ang="0">
+                <a:pos x="connsiteX9" y="connsiteY9"/>
+              </a:cxn>
+              <a:cxn ang="0">
+                <a:pos x="connsiteX10" y="connsiteY10"/>
+              </a:cxn>
+              <a:cxn ang="0">
+                <a:pos x="connsiteX11" y="connsiteY11"/>
+              </a:cxn>
+              <a:cxn ang="0">
+                <a:pos x="connsiteX12" y="connsiteY12"/>
+              </a:cxn>
+              <a:cxn ang="0">
+                <a:pos x="connsiteX13" y="connsiteY13"/>
+              </a:cxn>
+              <a:cxn ang="0">
+                <a:pos x="connsiteX14" y="connsiteY14"/>
+              </a:cxn>
+              <a:cxn ang="0">
+                <a:pos x="connsiteX15" y="connsiteY15"/>
+              </a:cxn>
+              <a:cxn ang="0">
+                <a:pos x="connsiteX16" y="connsiteY16"/>
+              </a:cxn>
+              <a:cxn ang="0">
+                <a:pos x="connsiteX17" y="connsiteY17"/>
+              </a:cxn>
+              <a:cxn ang="0">
+                <a:pos x="connsiteX18" y="connsiteY18"/>
+              </a:cxn>
+              <a:cxn ang="0">
+                <a:pos x="connsiteX19" y="connsiteY19"/>
+              </a:cxn>
+            </a:cxnLst>
+            <a:rect l="l" t="t" r="r" b="b"/>
+            <a:pathLst>
+              <a:path w="8170246" h="6858000">
+                <a:moveTo>
+                  <a:pt x="4738960" y="0"/>
+                </a:moveTo>
+                <a:lnTo>
+                  <a:pt x="4862151" y="0"/>
+                </a:lnTo>
+                <a:cubicBezTo>
+                  <a:pt x="4862151" y="0"/>
+                  <a:pt x="4862151" y="0"/>
+                  <a:pt x="8088169" y="3226735"/>
+                </a:cubicBezTo>
+                <a:cubicBezTo>
+                  <a:pt x="8197606" y="3336196"/>
+                  <a:pt x="8197606" y="3517045"/>
+                  <a:pt x="8088169" y="3626507"/>
+                </a:cubicBezTo>
+                <a:cubicBezTo>
+                  <a:pt x="8088169" y="3626507"/>
+                  <a:pt x="8088169" y="3626507"/>
+                  <a:pt x="4857393" y="6858000"/>
+                </a:cubicBezTo>
+                <a:cubicBezTo>
+                  <a:pt x="4857393" y="6858000"/>
+                  <a:pt x="4857393" y="6858000"/>
+                  <a:pt x="4783581" y="6858000"/>
+                </a:cubicBezTo>
+                <a:lnTo>
+                  <a:pt x="4734202" y="6858000"/>
+                </a:lnTo>
+                <a:cubicBezTo>
+                  <a:pt x="7964978" y="3626507"/>
+                  <a:pt x="7964978" y="3626507"/>
+                  <a:pt x="7964978" y="3626507"/>
+                </a:cubicBezTo>
+                <a:cubicBezTo>
+                  <a:pt x="8074415" y="3517045"/>
+                  <a:pt x="8074415" y="3336196"/>
+                  <a:pt x="7964978" y="3226735"/>
+                </a:cubicBezTo>
+                <a:cubicBezTo>
+                  <a:pt x="4738960" y="0"/>
+                  <a:pt x="4738960" y="0"/>
+                  <a:pt x="4738960" y="0"/>
+                </a:cubicBezTo>
+                <a:close/>
+                <a:moveTo>
+                  <a:pt x="0" y="0"/>
+                </a:moveTo>
+                <a:lnTo>
+                  <a:pt x="98791" y="0"/>
+                </a:lnTo>
+                <a:cubicBezTo>
+                  <a:pt x="1075904" y="0"/>
+                  <a:pt x="2469401" y="0"/>
+                  <a:pt x="4456718" y="0"/>
+                </a:cubicBezTo>
+                <a:lnTo>
+                  <a:pt x="4603489" y="0"/>
+                </a:lnTo>
+                <a:cubicBezTo>
+                  <a:pt x="4603489" y="0"/>
+                  <a:pt x="4603489" y="0"/>
+                  <a:pt x="7829507" y="3226735"/>
+                </a:cubicBezTo>
+                <a:cubicBezTo>
+                  <a:pt x="7938944" y="3336196"/>
+                  <a:pt x="7938944" y="3517045"/>
+                  <a:pt x="7829507" y="3626507"/>
+                </a:cubicBezTo>
+                <a:cubicBezTo>
+                  <a:pt x="7829507" y="3626507"/>
+                  <a:pt x="7829507" y="3626507"/>
+                  <a:pt x="4598731" y="6858000"/>
+                </a:cubicBezTo>
+                <a:lnTo>
+                  <a:pt x="4540663" y="6858000"/>
+                </a:lnTo>
+                <a:cubicBezTo>
+                  <a:pt x="4077749" y="6858000"/>
+                  <a:pt x="2938270" y="6858000"/>
+                  <a:pt x="133398" y="6858000"/>
+                </a:cubicBezTo>
+                <a:lnTo>
+                  <a:pt x="0" y="6858000"/>
+                </a:lnTo>
+                <a:close/>
+              </a:path>
+            </a:pathLst>
+          </a:custGeom>
+          <a:ln>
+            <a:noFill/>
+          </a:ln>
+          <a:effectLst/>
+        </p:spPr>
+        <p:style>
+          <a:lnRef idx="1">
+            <a:schemeClr val="accent1"/>
+          </a:lnRef>
+          <a:fillRef idx="3">
+            <a:schemeClr val="accent1"/>
+          </a:fillRef>
+          <a:effectRef idx="2">
+            <a:schemeClr val="accent1"/>
+          </a:effectRef>
+          <a:fontRef idx="minor">
+            <a:schemeClr val="lt1"/>
+          </a:fontRef>
+        </p:style>
+        <p:txBody>
+          <a:bodyPr vert="horz" wrap="square" lIns="91440" tIns="45720" rIns="91440" bIns="45720" numCol="1" anchor="t" anchorCtr="0" compatLnSpc="1">
+            <a:prstTxWarp prst="textNoShape">
+              <a:avLst/>
+            </a:prstTxWarp>
+            <a:noAutofit/>
+          </a:bodyPr>
+          <a:lstStyle/>
+          <a:p>
+            <a:endParaRPr lang="en-US" dirty="0"/>
+          </a:p>
+        </p:txBody>
+      </p:sp>
       <p:sp>
         <p:nvSpPr>
           <p:cNvPr id="2" name="Title 1">
@@ -17764,15 +18279,83 @@
             <p:ph type="title"/>
           </p:nvPr>
         </p:nvSpPr>
-        <p:spPr/>
+        <p:spPr>
+          <a:xfrm>
+            <a:off x="535525" y="624110"/>
+            <a:ext cx="4623955" cy="1280890"/>
+          </a:xfrm>
+        </p:spPr>
+        <p:txBody>
+          <a:bodyPr>
+            <a:normAutofit/>
+          </a:bodyPr>
+          <a:lstStyle/>
+          <a:p>
+            <a:r>
+              <a:rPr lang="en-US" sz="3300"/>
+              <a:t>Inspiration for Underground Tactics</a:t>
+            </a:r>
+          </a:p>
+        </p:txBody>
+      </p:sp>
+      <p:sp>
+        <p:nvSpPr>
+          <p:cNvPr id="15" name="Rectangle 14">
+            <a:extLst>
+              <a:ext uri="{FF2B5EF4-FFF2-40B4-BE49-F238E27FC236}">
+                <a16:creationId xmlns:a16="http://schemas.microsoft.com/office/drawing/2014/main" id="{433DF4D3-8A35-461A-ABE0-F56B78A1371F}"/>
+              </a:ext>
+              <a:ext uri="{C183D7F6-B498-43B3-948B-1728B52AA6E4}">
+                <adec:decorative xmlns:adec="http://schemas.microsoft.com/office/drawing/2017/decorative" val="1"/>
+              </a:ext>
+            </a:extLst>
+          </p:cNvPr>
+          <p:cNvSpPr>
+            <a:spLocks noGrp="1" noRot="1" noChangeAspect="1" noMove="1" noResize="1" noEditPoints="1" noAdjustHandles="1" noChangeArrowheads="1" noChangeShapeType="1" noTextEdit="1"/>
+          </p:cNvSpPr>
+          <p:nvPr>
+            <p:extLst>
+              <p:ext uri="{386F3935-93C4-4BCD-93E2-E3B085C9AB24}">
+                <p16:designElem xmlns:p16="http://schemas.microsoft.com/office/powerpoint/2015/main" val="1"/>
+              </p:ext>
+            </p:extLst>
+          </p:nvPr>
+        </p:nvSpPr>
+        <p:spPr>
+          <a:xfrm>
+            <a:off x="0" y="0"/>
+            <a:ext cx="182880" cy="6858000"/>
+          </a:xfrm>
+          <a:prstGeom prst="rect">
+            <a:avLst/>
+          </a:prstGeom>
+          <a:solidFill>
+            <a:schemeClr val="tx2"/>
+          </a:solidFill>
+          <a:ln>
+            <a:noFill/>
+          </a:ln>
+          <a:effectLst/>
+        </p:spPr>
+        <p:style>
+          <a:lnRef idx="1">
+            <a:schemeClr val="accent1"/>
+          </a:lnRef>
+          <a:fillRef idx="3">
+            <a:schemeClr val="accent1"/>
+          </a:fillRef>
+          <a:effectRef idx="2">
+            <a:schemeClr val="accent1"/>
+          </a:effectRef>
+          <a:fontRef idx="minor">
+            <a:schemeClr val="lt1"/>
+          </a:fontRef>
+        </p:style>
         <p:txBody>
           <a:bodyPr/>
           <a:lstStyle/>
           <a:p>
-            <a:r>
-              <a:rPr lang="en-US" dirty="0"/>
-              <a:t>Inspiration for The Adventure of Salvatore</a:t>
-            </a:r>
+            <a:endParaRPr lang="en-US"/>
           </a:p>
         </p:txBody>
       </p:sp>
@@ -17792,9 +18375,16 @@
             <p:ph idx="1"/>
           </p:nvPr>
         </p:nvSpPr>
-        <p:spPr/>
+        <p:spPr>
+          <a:xfrm>
+            <a:off x="531812" y="2133600"/>
+            <a:ext cx="4625882" cy="3777622"/>
+          </a:xfrm>
+        </p:spPr>
         <p:txBody>
-          <a:bodyPr/>
+          <a:bodyPr>
+            <a:normAutofit/>
+          </a:bodyPr>
           <a:lstStyle/>
           <a:p>
             <a:r>
@@ -17805,8 +18395,32 @@
           <a:p>
             <a:r>
               <a:rPr lang="en-US" dirty="0"/>
-              <a:t>Diablo (the original)</a:t>
+              <a:t>The Adventures of Salvatore</a:t>
             </a:r>
+          </a:p>
+          <a:p>
+            <a:r>
+              <a:rPr lang="en-US" dirty="0"/>
+              <a:t>Dungeons and Dragons (Rules)</a:t>
+            </a:r>
+          </a:p>
+          <a:p>
+            <a:r>
+              <a:rPr lang="en-US" dirty="0"/>
+              <a:t>Final Fantasy Tactics</a:t>
+            </a:r>
+          </a:p>
+          <a:p>
+            <a:r>
+              <a:rPr lang="en-US" dirty="0"/>
+              <a:t>Throneless</a:t>
+            </a:r>
+          </a:p>
+          <a:p>
+            <a:endParaRPr lang="en-US" dirty="0"/>
+          </a:p>
+          <a:p>
+            <a:endParaRPr lang="en-US" dirty="0"/>
           </a:p>
           <a:p>
             <a:pPr marL="0" indent="0">
@@ -17816,42 +18430,6 @@
           </a:p>
         </p:txBody>
       </p:sp>
-      <p:pic>
-        <p:nvPicPr>
-          <p:cNvPr id="6" name="Picture 5" descr="A video game advertisement with a red and orange monster&#10;&#10;Description automatically generated">
-            <a:extLst>
-              <a:ext uri="{FF2B5EF4-FFF2-40B4-BE49-F238E27FC236}">
-                <a16:creationId xmlns:a16="http://schemas.microsoft.com/office/drawing/2014/main" id="{D3AEEAF6-3AE7-327F-D32B-020B93A9F4D9}"/>
-              </a:ext>
-            </a:extLst>
-          </p:cNvPr>
-          <p:cNvPicPr>
-            <a:picLocks noChangeAspect="1"/>
-          </p:cNvPicPr>
-          <p:nvPr/>
-        </p:nvPicPr>
-        <p:blipFill>
-          <a:blip r:embed="rId2">
-            <a:extLst>
-              <a:ext uri="{28A0092B-C50C-407E-A947-70E740481C1C}">
-                <a14:useLocalDpi xmlns:a14="http://schemas.microsoft.com/office/drawing/2010/main" val="0"/>
-              </a:ext>
-            </a:extLst>
-          </a:blip>
-          <a:stretch>
-            <a:fillRect/>
-          </a:stretch>
-        </p:blipFill>
-        <p:spPr>
-          <a:xfrm>
-            <a:off x="7046912" y="3590617"/>
-            <a:ext cx="3297872" cy="2459663"/>
-          </a:xfrm>
-          <a:prstGeom prst="rect">
-            <a:avLst/>
-          </a:prstGeom>
-        </p:spPr>
-      </p:pic>
     </p:spTree>
     <p:extLst>
       <p:ext uri="{BB962C8B-B14F-4D97-AF65-F5344CB8AC3E}">
@@ -17988,7 +18566,7 @@
           <a:p>
             <a:r>
               <a:rPr lang="en-US" dirty="0"/>
-              <a:t>The Vision of The Adventure of Salvatore</a:t>
+              <a:t>The Vision of Underground Tactics</a:t>
             </a:r>
           </a:p>
         </p:txBody>
@@ -18016,7 +18594,15 @@
           <a:p>
             <a:r>
               <a:rPr lang="en-US" dirty="0"/>
-              <a:t>An adventure of Salvatore slaying goblins and bugbears in a castle, and skeletons and wizards in the catacombs.</a:t>
+              <a:t>An </a:t>
+            </a:r>
+            <a:r>
+              <a:rPr lang="en-US"/>
+              <a:t>adventure of slaying </a:t>
+            </a:r>
+            <a:r>
+              <a:rPr lang="en-US" dirty="0"/>
+              <a:t>goblins and bugbears in a castle, and skeletons and wizards in the catacombs.</a:t>
             </a:r>
           </a:p>
           <a:p>
@@ -18049,8 +18635,21 @@
             <a:pPr lvl="1"/>
             <a:r>
               <a:rPr lang="en-US" dirty="0"/>
-              <a:t>A lure into the castle, to discover an adventure awaits in the catacombs.</a:t>
+              <a:t>A lure into the underground.</a:t>
             </a:r>
+          </a:p>
+          <a:p>
+            <a:r>
+              <a:rPr lang="en-US" dirty="0"/>
+              <a:t>Creating D&amp;D combat and quests… but on the computer </a:t>
+            </a:r>
+            <a:r>
+              <a:rPr lang="en-US" dirty="0">
+                <a:sym typeface="Wingdings" panose="05000000000000000000" pitchFamily="2" charset="2"/>
+              </a:rPr>
+              <a:t></a:t>
+            </a:r>
+            <a:endParaRPr lang="en-US" dirty="0"/>
           </a:p>
           <a:p>
             <a:pPr indent="-285750"/>
@@ -18138,7 +18737,7 @@
             <p:ph idx="1"/>
             <p:extLst>
               <p:ext uri="{D42A27DB-BD31-4B8C-83A1-F6EECF244321}">
-                <p14:modId xmlns:p14="http://schemas.microsoft.com/office/powerpoint/2010/main" val="94623868"/>
+                <p14:modId xmlns:p14="http://schemas.microsoft.com/office/powerpoint/2010/main" val="3072405774"/>
               </p:ext>
             </p:extLst>
           </p:nvPr>
@@ -18402,7 +19001,7 @@
             </a:r>
             <a:r>
               <a:rPr lang="en-US" dirty="0"/>
-              <a:t>-Adventure-Of-Salvatore</a:t>
+              <a:t>-underground-tactics</a:t>
             </a:r>
           </a:p>
           <a:p>

</xml_diff>